<commit_message>
Màj Word et code
</commit_message>
<xml_diff>
--- a/Présentation modèle robot.pptx
+++ b/Présentation modèle robot.pptx
@@ -4773,7 +4773,7 @@
           <a:p>
             <a:fld id="{606E8360-5791-4FF0-B29D-2E06300F7BFE}" type="datetimeFigureOut">
               <a:rPr lang="fr-FR" smtClean="0"/>
-              <a:t>04/06/2025</a:t>
+              <a:t>13/06/2025</a:t>
             </a:fld>
             <a:endParaRPr lang="fr-FR"/>
           </a:p>
@@ -5323,7 +5323,7 @@
           <a:p>
             <a:fld id="{54FF60A6-5106-4F56-AF7A-8E5695C25D8E}" type="datetime1">
               <a:rPr lang="en-US" smtClean="0"/>
-              <a:t>6/4/2025</a:t>
+              <a:t>6/13/2025</a:t>
             </a:fld>
             <a:endParaRPr lang="en-US"/>
           </a:p>
@@ -5562,7 +5562,7 @@
           <a:p>
             <a:fld id="{9F5C7EB5-9668-4115-9EC5-8C7509F3445C}" type="datetime1">
               <a:rPr lang="en-US" smtClean="0"/>
-              <a:t>6/4/2025</a:t>
+              <a:t>6/13/2025</a:t>
             </a:fld>
             <a:endParaRPr lang="en-US"/>
           </a:p>
@@ -6894,14 +6894,14 @@
           <p:nvPr>
             <p:extLst>
               <p:ext uri="{D42A27DB-BD31-4B8C-83A1-F6EECF244321}">
-                <p14:modId xmlns:p14="http://schemas.microsoft.com/office/powerpoint/2010/main" val="3413500665"/>
+                <p14:modId xmlns:p14="http://schemas.microsoft.com/office/powerpoint/2010/main" val="2340323400"/>
               </p:ext>
             </p:extLst>
           </p:nvPr>
         </p:nvGraphicFramePr>
         <p:xfrm>
           <a:off x="2047875" y="4491038"/>
-          <a:ext cx="5924550" cy="927100"/>
+          <a:ext cx="5924550" cy="896192"/>
         </p:xfrm>
         <a:graphic>
           <a:graphicData uri="http://schemas.openxmlformats.org/presentationml/2006/ole">
@@ -6935,7 +6935,7 @@
                     <p:spPr>
                       <a:xfrm>
                         <a:off x="2047875" y="4491038"/>
-                        <a:ext cx="5924550" cy="927100"/>
+                        <a:ext cx="5924550" cy="896192"/>
                       </a:xfrm>
                       <a:prstGeom prst="rect">
                         <a:avLst/>

</xml_diff>